<commit_message>
complete cache read function
</commit_message>
<xml_diff>
--- a/HW2/Q1 and Q2/Q1.pptx
+++ b/HW2/Q1 and Q2/Q1.pptx
@@ -215,7 +215,7 @@
           <a:p>
             <a:fld id="{3DFD9C30-352A-45CA-995F-8FF46836B6B4}" type="datetimeFigureOut">
               <a:rPr lang="zh-CN" altLang="en-US" smtClean="0"/>
-              <a:t>16/11/5</a:t>
+              <a:t>16/11/7</a:t>
             </a:fld>
             <a:endParaRPr lang="zh-CN" altLang="en-US"/>
           </a:p>
@@ -381,7 +381,7 @@
           <a:p>
             <a:fld id="{03B2909F-604E-47D0-B343-82CB8ECDE46A}" type="datetimeFigureOut">
               <a:rPr lang="en-US" smtClean="0"/>
-              <a:t>11/5/2016</a:t>
+              <a:t>11/7/2016</a:t>
             </a:fld>
             <a:endParaRPr lang="en-US"/>
           </a:p>
@@ -778,7 +778,7 @@
           <a:p>
             <a:fld id="{0B5A95A3-987E-4AF8-9783-EF568CAD7ABC}" type="datetime1">
               <a:rPr lang="en-US" altLang="zh-CN" smtClean="0"/>
-              <a:t>11/5/2016</a:t>
+              <a:t>11/7/2016</a:t>
             </a:fld>
             <a:endParaRPr lang="en-US"/>
           </a:p>
@@ -946,7 +946,7 @@
           <a:p>
             <a:fld id="{76F58666-E663-4CDC-9C26-ED95A1361FEF}" type="datetime1">
               <a:rPr lang="en-US" altLang="zh-CN" smtClean="0"/>
-              <a:t>11/5/2016</a:t>
+              <a:t>11/7/2016</a:t>
             </a:fld>
             <a:endParaRPr lang="en-US"/>
           </a:p>
@@ -1124,7 +1124,7 @@
           <a:p>
             <a:fld id="{410BB41B-7875-451E-ADEC-E67AF1A482DD}" type="datetime1">
               <a:rPr lang="en-US" altLang="zh-CN" smtClean="0"/>
-              <a:t>11/5/2016</a:t>
+              <a:t>11/7/2016</a:t>
             </a:fld>
             <a:endParaRPr lang="en-US"/>
           </a:p>
@@ -1292,7 +1292,7 @@
           <a:p>
             <a:fld id="{C8FD43E0-F1EC-4F5F-92E9-1C7EFF8AA242}" type="datetime1">
               <a:rPr lang="en-US" altLang="zh-CN" smtClean="0"/>
-              <a:t>11/5/2016</a:t>
+              <a:t>11/7/2016</a:t>
             </a:fld>
             <a:endParaRPr lang="en-US"/>
           </a:p>
@@ -1537,7 +1537,7 @@
           <a:p>
             <a:fld id="{64F38D16-F81E-49E5-B3FB-DC053A8ED5F6}" type="datetime1">
               <a:rPr lang="en-US" altLang="zh-CN" smtClean="0"/>
-              <a:t>11/5/2016</a:t>
+              <a:t>11/7/2016</a:t>
             </a:fld>
             <a:endParaRPr lang="en-US"/>
           </a:p>
@@ -1766,7 +1766,7 @@
           <a:p>
             <a:fld id="{367F854D-1093-478C-A020-BFA105FB17D1}" type="datetime1">
               <a:rPr lang="en-US" altLang="zh-CN" smtClean="0"/>
-              <a:t>11/5/2016</a:t>
+              <a:t>11/7/2016</a:t>
             </a:fld>
             <a:endParaRPr lang="en-US"/>
           </a:p>
@@ -2130,7 +2130,7 @@
           <a:p>
             <a:fld id="{2F69398B-974E-43F0-BE40-49D8519AEB99}" type="datetime1">
               <a:rPr lang="en-US" altLang="zh-CN" smtClean="0"/>
-              <a:t>11/5/2016</a:t>
+              <a:t>11/7/2016</a:t>
             </a:fld>
             <a:endParaRPr lang="en-US"/>
           </a:p>
@@ -2247,7 +2247,7 @@
           <a:p>
             <a:fld id="{827CF29C-8417-4C0B-929F-35AF3F17CBE4}" type="datetime1">
               <a:rPr lang="en-US" altLang="zh-CN" smtClean="0"/>
-              <a:t>11/5/2016</a:t>
+              <a:t>11/7/2016</a:t>
             </a:fld>
             <a:endParaRPr lang="en-US"/>
           </a:p>
@@ -2342,7 +2342,7 @@
           <a:p>
             <a:fld id="{074218F0-B902-4D5B-893A-A91CC9EC6134}" type="datetime1">
               <a:rPr lang="en-US" altLang="zh-CN" smtClean="0"/>
-              <a:t>11/5/2016</a:t>
+              <a:t>11/7/2016</a:t>
             </a:fld>
             <a:endParaRPr lang="en-US"/>
           </a:p>
@@ -2617,7 +2617,7 @@
           <a:p>
             <a:fld id="{086CF1C3-9602-4052-8E67-6E5338F75420}" type="datetime1">
               <a:rPr lang="en-US" altLang="zh-CN" smtClean="0"/>
-              <a:t>11/5/2016</a:t>
+              <a:t>11/7/2016</a:t>
             </a:fld>
             <a:endParaRPr lang="en-US"/>
           </a:p>
@@ -2869,7 +2869,7 @@
           <a:p>
             <a:fld id="{1BC1025B-225B-4CD6-B76F-47183BC90FC1}" type="datetime1">
               <a:rPr lang="en-US" altLang="zh-CN" smtClean="0"/>
-              <a:t>11/5/2016</a:t>
+              <a:t>11/7/2016</a:t>
             </a:fld>
             <a:endParaRPr lang="en-US"/>
           </a:p>
@@ -3080,7 +3080,7 @@
           <a:p>
             <a:fld id="{22022C8B-30C2-4468-9AB1-1C03386FA471}" type="datetime1">
               <a:rPr lang="en-US" altLang="zh-CN" smtClean="0"/>
-              <a:t>11/5/2016</a:t>
+              <a:t>11/7/2016</a:t>
             </a:fld>
             <a:endParaRPr lang="en-US"/>
           </a:p>
@@ -4213,120 +4213,6 @@
           </p:txBody>
         </p:sp>
       </p:grpSp>
-      <p:grpSp>
-        <p:nvGrpSpPr>
-          <p:cNvPr id="119" name="组合 118"/>
-          <p:cNvGrpSpPr/>
-          <p:nvPr/>
-        </p:nvGrpSpPr>
-        <p:grpSpPr>
-          <a:xfrm>
-            <a:off x="9440166" y="2523719"/>
-            <a:ext cx="301971" cy="2862803"/>
-            <a:chOff x="1350100" y="1479665"/>
-            <a:chExt cx="553999" cy="4018202"/>
-          </a:xfrm>
-        </p:grpSpPr>
-        <p:sp>
-          <p:nvSpPr>
-            <p:cNvPr id="120" name="Rectangle 3"/>
-            <p:cNvSpPr/>
-            <p:nvPr/>
-          </p:nvSpPr>
-          <p:spPr>
-            <a:xfrm>
-              <a:off x="1350100" y="1479665"/>
-              <a:ext cx="553999" cy="4018202"/>
-            </a:xfrm>
-            <a:prstGeom prst="rect">
-              <a:avLst/>
-            </a:prstGeom>
-            <a:noFill/>
-            <a:ln>
-              <a:solidFill>
-                <a:schemeClr val="tx1"/>
-              </a:solidFill>
-            </a:ln>
-          </p:spPr>
-          <p:style>
-            <a:lnRef idx="2">
-              <a:schemeClr val="accent1">
-                <a:shade val="50000"/>
-              </a:schemeClr>
-            </a:lnRef>
-            <a:fillRef idx="1">
-              <a:schemeClr val="accent1"/>
-            </a:fillRef>
-            <a:effectRef idx="0">
-              <a:schemeClr val="accent1"/>
-            </a:effectRef>
-            <a:fontRef idx="minor">
-              <a:schemeClr val="lt1"/>
-            </a:fontRef>
-          </p:style>
-          <p:txBody>
-            <a:bodyPr vert="vert270" rtlCol="0" anchor="ctr" anchorCtr="0"/>
-            <a:lstStyle/>
-            <a:p>
-              <a:pPr algn="ctr"/>
-              <a:r>
-                <a:rPr lang="en-US" altLang="zh-CN" sz="1200" b="1" dirty="0">
-                  <a:solidFill>
-                    <a:schemeClr val="tx1"/>
-                  </a:solidFill>
-                </a:rPr>
-                <a:t>FLIP-FLOP</a:t>
-              </a:r>
-            </a:p>
-          </p:txBody>
-        </p:sp>
-        <p:sp>
-          <p:nvSpPr>
-            <p:cNvPr id="121" name="Isosceles Triangle 5"/>
-            <p:cNvSpPr/>
-            <p:nvPr/>
-          </p:nvSpPr>
-          <p:spPr>
-            <a:xfrm>
-              <a:off x="1571204" y="5280509"/>
-              <a:ext cx="155391" cy="217358"/>
-            </a:xfrm>
-            <a:prstGeom prst="triangle">
-              <a:avLst/>
-            </a:prstGeom>
-            <a:noFill/>
-            <a:ln>
-              <a:solidFill>
-                <a:schemeClr val="tx1"/>
-              </a:solidFill>
-            </a:ln>
-          </p:spPr>
-          <p:style>
-            <a:lnRef idx="2">
-              <a:schemeClr val="accent1">
-                <a:shade val="50000"/>
-              </a:schemeClr>
-            </a:lnRef>
-            <a:fillRef idx="1">
-              <a:schemeClr val="accent1"/>
-            </a:fillRef>
-            <a:effectRef idx="0">
-              <a:schemeClr val="accent1"/>
-            </a:effectRef>
-            <a:fontRef idx="minor">
-              <a:schemeClr val="lt1"/>
-            </a:fontRef>
-          </p:style>
-          <p:txBody>
-            <a:bodyPr rtlCol="0" anchor="ctr"/>
-            <a:lstStyle/>
-            <a:p>
-              <a:pPr algn="ctr"/>
-              <a:endParaRPr lang="en-US" sz="1200"/>
-            </a:p>
-          </p:txBody>
-        </p:sp>
-      </p:grpSp>
       <p:cxnSp>
         <p:nvCxnSpPr>
           <p:cNvPr id="132" name="直接箭头连接符 131"/>
@@ -4747,81 +4633,6 @@
           </a:fontRef>
         </p:style>
       </p:cxnSp>
-      <p:cxnSp>
-        <p:nvCxnSpPr>
-          <p:cNvPr id="276" name="直接箭头连接符 275"/>
-          <p:cNvCxnSpPr>
-            <a:stCxn id="114" idx="3"/>
-          </p:cNvCxnSpPr>
-          <p:nvPr/>
-        </p:nvCxnSpPr>
-        <p:spPr>
-          <a:xfrm>
-            <a:off x="9001677" y="3987237"/>
-            <a:ext cx="438489" cy="7888"/>
-          </a:xfrm>
-          <a:prstGeom prst="straightConnector1">
-            <a:avLst/>
-          </a:prstGeom>
-          <a:ln w="28575">
-            <a:tailEnd type="triangle"/>
-          </a:ln>
-        </p:spPr>
-        <p:style>
-          <a:lnRef idx="1">
-            <a:schemeClr val="accent1"/>
-          </a:lnRef>
-          <a:fillRef idx="0">
-            <a:schemeClr val="accent1"/>
-          </a:fillRef>
-          <a:effectRef idx="0">
-            <a:schemeClr val="accent1"/>
-          </a:effectRef>
-          <a:fontRef idx="minor">
-            <a:schemeClr val="tx1"/>
-          </a:fontRef>
-        </p:style>
-      </p:cxnSp>
-      <p:cxnSp>
-        <p:nvCxnSpPr>
-          <p:cNvPr id="284" name="连接符: 肘形 283"/>
-          <p:cNvCxnSpPr>
-            <a:stCxn id="120" idx="3"/>
-            <a:endCxn id="45" idx="1"/>
-          </p:cNvCxnSpPr>
-          <p:nvPr/>
-        </p:nvCxnSpPr>
-        <p:spPr>
-          <a:xfrm flipH="1">
-            <a:off x="5815319" y="3955121"/>
-            <a:ext cx="3926818" cy="567271"/>
-          </a:xfrm>
-          <a:prstGeom prst="bentConnector5">
-            <a:avLst>
-              <a:gd name="adj1" fmla="val -5822"/>
-              <a:gd name="adj2" fmla="val 292629"/>
-              <a:gd name="adj3" fmla="val 105822"/>
-            </a:avLst>
-          </a:prstGeom>
-          <a:ln w="28575">
-            <a:tailEnd type="triangle"/>
-          </a:ln>
-        </p:spPr>
-        <p:style>
-          <a:lnRef idx="1">
-            <a:schemeClr val="accent1"/>
-          </a:lnRef>
-          <a:fillRef idx="0">
-            <a:schemeClr val="accent1"/>
-          </a:fillRef>
-          <a:effectRef idx="0">
-            <a:schemeClr val="accent1"/>
-          </a:effectRef>
-          <a:fontRef idx="minor">
-            <a:schemeClr val="tx1"/>
-          </a:fontRef>
-        </p:style>
-      </p:cxnSp>
       <p:sp>
         <p:nvSpPr>
           <p:cNvPr id="293" name="梯形 292"/>
@@ -5009,125 +4820,6 @@
           </a:fontRef>
         </p:style>
       </p:cxnSp>
-      <p:grpSp>
-        <p:nvGrpSpPr>
-          <p:cNvPr id="340" name="组合 339"/>
-          <p:cNvGrpSpPr/>
-          <p:nvPr/>
-        </p:nvGrpSpPr>
-        <p:grpSpPr>
-          <a:xfrm>
-            <a:off x="5094441" y="3955120"/>
-            <a:ext cx="211958" cy="733341"/>
-            <a:chOff x="1350100" y="1479665"/>
-            <a:chExt cx="553999" cy="4018202"/>
-          </a:xfrm>
-        </p:grpSpPr>
-        <p:sp>
-          <p:nvSpPr>
-            <p:cNvPr id="341" name="Rectangle 3"/>
-            <p:cNvSpPr/>
-            <p:nvPr/>
-          </p:nvSpPr>
-          <p:spPr>
-            <a:xfrm>
-              <a:off x="1350100" y="1479665"/>
-              <a:ext cx="553999" cy="4018202"/>
-            </a:xfrm>
-            <a:prstGeom prst="rect">
-              <a:avLst/>
-            </a:prstGeom>
-            <a:noFill/>
-            <a:ln>
-              <a:solidFill>
-                <a:schemeClr val="tx1"/>
-              </a:solidFill>
-            </a:ln>
-          </p:spPr>
-          <p:style>
-            <a:lnRef idx="2">
-              <a:schemeClr val="accent1">
-                <a:shade val="50000"/>
-              </a:schemeClr>
-            </a:lnRef>
-            <a:fillRef idx="1">
-              <a:schemeClr val="accent1"/>
-            </a:fillRef>
-            <a:effectRef idx="0">
-              <a:schemeClr val="accent1"/>
-            </a:effectRef>
-            <a:fontRef idx="minor">
-              <a:schemeClr val="lt1"/>
-            </a:fontRef>
-          </p:style>
-          <p:txBody>
-            <a:bodyPr vert="vert270" rtlCol="0" anchor="ctr" anchorCtr="0"/>
-            <a:lstStyle/>
-            <a:p>
-              <a:pPr algn="ctr"/>
-              <a:r>
-                <a:rPr lang="en-US" altLang="zh-CN" sz="1050" b="1" dirty="0">
-                  <a:solidFill>
-                    <a:schemeClr val="tx1"/>
-                  </a:solidFill>
-                </a:rPr>
-                <a:t>FLIP-FLOP</a:t>
-              </a:r>
-              <a:endParaRPr lang="en-US" altLang="zh-CN" sz="1200" b="1" dirty="0">
-                <a:solidFill>
-                  <a:schemeClr val="tx1"/>
-                </a:solidFill>
-              </a:endParaRPr>
-            </a:p>
-          </p:txBody>
-        </p:sp>
-        <p:sp>
-          <p:nvSpPr>
-            <p:cNvPr id="342" name="Isosceles Triangle 5"/>
-            <p:cNvSpPr/>
-            <p:nvPr/>
-          </p:nvSpPr>
-          <p:spPr>
-            <a:xfrm>
-              <a:off x="1571204" y="5280509"/>
-              <a:ext cx="155391" cy="217358"/>
-            </a:xfrm>
-            <a:prstGeom prst="triangle">
-              <a:avLst/>
-            </a:prstGeom>
-            <a:noFill/>
-            <a:ln>
-              <a:solidFill>
-                <a:schemeClr val="tx1"/>
-              </a:solidFill>
-            </a:ln>
-          </p:spPr>
-          <p:style>
-            <a:lnRef idx="2">
-              <a:schemeClr val="accent1">
-                <a:shade val="50000"/>
-              </a:schemeClr>
-            </a:lnRef>
-            <a:fillRef idx="1">
-              <a:schemeClr val="accent1"/>
-            </a:fillRef>
-            <a:effectRef idx="0">
-              <a:schemeClr val="accent1"/>
-            </a:effectRef>
-            <a:fontRef idx="minor">
-              <a:schemeClr val="lt1"/>
-            </a:fontRef>
-          </p:style>
-          <p:txBody>
-            <a:bodyPr rtlCol="0" anchor="ctr"/>
-            <a:lstStyle/>
-            <a:p>
-              <a:pPr algn="ctr"/>
-              <a:endParaRPr lang="en-US" sz="1200"/>
-            </a:p>
-          </p:txBody>
-        </p:sp>
-      </p:grpSp>
       <p:cxnSp>
         <p:nvCxnSpPr>
           <p:cNvPr id="344" name="直接箭头连接符 343"/>
@@ -5356,39 +5048,6 @@
       </p:cxnSp>
       <p:sp>
         <p:nvSpPr>
-          <p:cNvPr id="368" name="TextBox 46"/>
-          <p:cNvSpPr txBox="1"/>
-          <p:nvPr/>
-        </p:nvSpPr>
-        <p:spPr>
-          <a:xfrm>
-            <a:off x="6568147" y="2953243"/>
-            <a:ext cx="877484" cy="276999"/>
-          </a:xfrm>
-          <a:prstGeom prst="rect">
-            <a:avLst/>
-          </a:prstGeom>
-          <a:noFill/>
-        </p:spPr>
-        <p:txBody>
-          <a:bodyPr wrap="none" rtlCol="0">
-            <a:spAutoFit/>
-          </a:bodyPr>
-          <a:lstStyle/>
-          <a:p>
-            <a:r>
-              <a:rPr lang="en-US" sz="1200" dirty="0" err="1"/>
-              <a:t>Wrt</a:t>
-            </a:r>
-            <a:r>
-              <a:rPr lang="en-US" sz="1200" dirty="0"/>
-              <a:t> Enable</a:t>
-            </a:r>
-          </a:p>
-        </p:txBody>
-      </p:sp>
-      <p:sp>
-        <p:nvSpPr>
           <p:cNvPr id="369" name="文本框 368"/>
           <p:cNvSpPr txBox="1"/>
           <p:nvPr/>
@@ -5451,6 +5110,274 @@
               <a:t> = 1</a:t>
             </a:r>
             <a:endParaRPr lang="zh-CN" altLang="en-US" sz="1200" dirty="0"/>
+          </a:p>
+        </p:txBody>
+      </p:sp>
+      <p:sp>
+        <p:nvSpPr>
+          <p:cNvPr id="58" name="文本框 57"/>
+          <p:cNvSpPr txBox="1"/>
+          <p:nvPr/>
+        </p:nvSpPr>
+        <p:spPr>
+          <a:xfrm>
+            <a:off x="8125258" y="4720425"/>
+            <a:ext cx="813043" cy="276999"/>
+          </a:xfrm>
+          <a:prstGeom prst="rect">
+            <a:avLst/>
+          </a:prstGeom>
+          <a:noFill/>
+        </p:spPr>
+        <p:txBody>
+          <a:bodyPr wrap="none" rtlCol="0">
+            <a:spAutoFit/>
+          </a:bodyPr>
+          <a:lstStyle/>
+          <a:p>
+            <a:r>
+              <a:rPr lang="en-US" altLang="zh-CN" sz="1200" dirty="0">
+                <a:solidFill>
+                  <a:schemeClr val="accent2"/>
+                </a:solidFill>
+              </a:rPr>
+              <a:t>op2 – op1</a:t>
+            </a:r>
+            <a:endParaRPr lang="zh-CN" altLang="en-US" sz="1200" dirty="0">
+              <a:solidFill>
+                <a:schemeClr val="accent2"/>
+              </a:solidFill>
+            </a:endParaRPr>
+          </a:p>
+        </p:txBody>
+      </p:sp>
+      <p:grpSp>
+        <p:nvGrpSpPr>
+          <p:cNvPr id="67" name="组合 66"/>
+          <p:cNvGrpSpPr/>
+          <p:nvPr/>
+        </p:nvGrpSpPr>
+        <p:grpSpPr>
+          <a:xfrm>
+            <a:off x="5094138" y="3950441"/>
+            <a:ext cx="211958" cy="838148"/>
+            <a:chOff x="1350100" y="1479665"/>
+            <a:chExt cx="553999" cy="4018202"/>
+          </a:xfrm>
+        </p:grpSpPr>
+        <p:sp>
+          <p:nvSpPr>
+            <p:cNvPr id="69" name="Rectangle 3"/>
+            <p:cNvSpPr/>
+            <p:nvPr/>
+          </p:nvSpPr>
+          <p:spPr>
+            <a:xfrm>
+              <a:off x="1350100" y="1479665"/>
+              <a:ext cx="553999" cy="4018202"/>
+            </a:xfrm>
+            <a:prstGeom prst="rect">
+              <a:avLst/>
+            </a:prstGeom>
+            <a:noFill/>
+            <a:ln>
+              <a:solidFill>
+                <a:schemeClr val="tx1"/>
+              </a:solidFill>
+            </a:ln>
+          </p:spPr>
+          <p:style>
+            <a:lnRef idx="2">
+              <a:schemeClr val="accent1">
+                <a:shade val="50000"/>
+              </a:schemeClr>
+            </a:lnRef>
+            <a:fillRef idx="1">
+              <a:schemeClr val="accent1"/>
+            </a:fillRef>
+            <a:effectRef idx="0">
+              <a:schemeClr val="accent1"/>
+            </a:effectRef>
+            <a:fontRef idx="minor">
+              <a:schemeClr val="lt1"/>
+            </a:fontRef>
+          </p:style>
+          <p:txBody>
+            <a:bodyPr vert="vert270" rtlCol="0" anchor="ctr" anchorCtr="0"/>
+            <a:lstStyle/>
+            <a:p>
+              <a:pPr algn="ctr"/>
+              <a:r>
+                <a:rPr lang="en-US" altLang="zh-CN" sz="1050" b="1" dirty="0">
+                  <a:solidFill>
+                    <a:schemeClr val="tx1"/>
+                  </a:solidFill>
+                </a:rPr>
+                <a:t>FLIP-FLOP</a:t>
+              </a:r>
+              <a:endParaRPr lang="en-US" altLang="zh-CN" sz="1200" b="1" dirty="0">
+                <a:solidFill>
+                  <a:schemeClr val="tx1"/>
+                </a:solidFill>
+              </a:endParaRPr>
+            </a:p>
+          </p:txBody>
+        </p:sp>
+        <p:sp>
+          <p:nvSpPr>
+            <p:cNvPr id="70" name="Isosceles Triangle 5"/>
+            <p:cNvSpPr/>
+            <p:nvPr/>
+          </p:nvSpPr>
+          <p:spPr>
+            <a:xfrm>
+              <a:off x="1571204" y="5280509"/>
+              <a:ext cx="155391" cy="217358"/>
+            </a:xfrm>
+            <a:prstGeom prst="triangle">
+              <a:avLst/>
+            </a:prstGeom>
+            <a:noFill/>
+            <a:ln>
+              <a:solidFill>
+                <a:schemeClr val="tx1"/>
+              </a:solidFill>
+            </a:ln>
+          </p:spPr>
+          <p:style>
+            <a:lnRef idx="2">
+              <a:schemeClr val="accent1">
+                <a:shade val="50000"/>
+              </a:schemeClr>
+            </a:lnRef>
+            <a:fillRef idx="1">
+              <a:schemeClr val="accent1"/>
+            </a:fillRef>
+            <a:effectRef idx="0">
+              <a:schemeClr val="accent1"/>
+            </a:effectRef>
+            <a:fontRef idx="minor">
+              <a:schemeClr val="lt1"/>
+            </a:fontRef>
+          </p:style>
+          <p:txBody>
+            <a:bodyPr rtlCol="0" anchor="ctr"/>
+            <a:lstStyle/>
+            <a:p>
+              <a:pPr algn="ctr"/>
+              <a:endParaRPr lang="en-US" sz="1200"/>
+            </a:p>
+          </p:txBody>
+        </p:sp>
+      </p:grpSp>
+      <p:cxnSp>
+        <p:nvCxnSpPr>
+          <p:cNvPr id="72" name="直接箭头连接符 71"/>
+          <p:cNvCxnSpPr/>
+          <p:nvPr/>
+        </p:nvCxnSpPr>
+        <p:spPr>
+          <a:xfrm>
+            <a:off x="5314629" y="4545870"/>
+            <a:ext cx="487044" cy="0"/>
+          </a:xfrm>
+          <a:prstGeom prst="straightConnector1">
+            <a:avLst/>
+          </a:prstGeom>
+          <a:ln w="28575">
+            <a:tailEnd type="triangle"/>
+          </a:ln>
+        </p:spPr>
+        <p:style>
+          <a:lnRef idx="1">
+            <a:schemeClr val="accent1"/>
+          </a:lnRef>
+          <a:fillRef idx="0">
+            <a:schemeClr val="accent1"/>
+          </a:fillRef>
+          <a:effectRef idx="0">
+            <a:schemeClr val="accent1"/>
+          </a:effectRef>
+          <a:fontRef idx="minor">
+            <a:schemeClr val="tx1"/>
+          </a:fontRef>
+        </p:style>
+      </p:cxnSp>
+      <p:cxnSp>
+        <p:nvCxnSpPr>
+          <p:cNvPr id="6" name="连接符: 肘形 5"/>
+          <p:cNvCxnSpPr/>
+          <p:nvPr/>
+        </p:nvCxnSpPr>
+        <p:spPr>
+          <a:xfrm flipH="1">
+            <a:off x="5094138" y="3987237"/>
+            <a:ext cx="3907539" cy="566761"/>
+          </a:xfrm>
+          <a:prstGeom prst="bentConnector5">
+            <a:avLst>
+              <a:gd name="adj1" fmla="val -5850"/>
+              <a:gd name="adj2" fmla="val 226213"/>
+              <a:gd name="adj3" fmla="val 105850"/>
+            </a:avLst>
+          </a:prstGeom>
+          <a:ln w="28575">
+            <a:tailEnd type="triangle"/>
+          </a:ln>
+        </p:spPr>
+        <p:style>
+          <a:lnRef idx="1">
+            <a:schemeClr val="accent1"/>
+          </a:lnRef>
+          <a:fillRef idx="0">
+            <a:schemeClr val="accent1"/>
+          </a:fillRef>
+          <a:effectRef idx="0">
+            <a:schemeClr val="accent1"/>
+          </a:effectRef>
+          <a:fontRef idx="minor">
+            <a:schemeClr val="tx1"/>
+          </a:fontRef>
+        </p:style>
+      </p:cxnSp>
+      <p:sp>
+        <p:nvSpPr>
+          <p:cNvPr id="74" name="TextBox 46"/>
+          <p:cNvSpPr txBox="1"/>
+          <p:nvPr/>
+        </p:nvSpPr>
+        <p:spPr>
+          <a:xfrm>
+            <a:off x="6552038" y="2916921"/>
+            <a:ext cx="877484" cy="276999"/>
+          </a:xfrm>
+          <a:prstGeom prst="rect">
+            <a:avLst/>
+          </a:prstGeom>
+          <a:noFill/>
+        </p:spPr>
+        <p:txBody>
+          <a:bodyPr wrap="none" rtlCol="0">
+            <a:spAutoFit/>
+          </a:bodyPr>
+          <a:lstStyle/>
+          <a:p>
+            <a:r>
+              <a:rPr lang="en-US" sz="1200" dirty="0" err="1">
+                <a:solidFill>
+                  <a:schemeClr val="accent2"/>
+                </a:solidFill>
+              </a:rPr>
+              <a:t>Wrt</a:t>
+            </a:r>
+            <a:r>
+              <a:rPr lang="en-US" sz="1200" dirty="0">
+                <a:solidFill>
+                  <a:schemeClr val="accent2"/>
+                </a:solidFill>
+              </a:rPr>
+              <a:t> Enable</a:t>
+            </a:r>
           </a:p>
         </p:txBody>
       </p:sp>

</xml_diff>